<commit_message>
new coding resources and excercises
</commit_message>
<xml_diff>
--- a/resources/coding/coding_necessities_2.pptx
+++ b/resources/coding/coding_necessities_2.pptx
@@ -523,7 +523,13 @@
           <a:p>
             <a:r>
               <a:rPr lang="en-US" dirty="0"/>
-              <a:t>Command and argument, </a:t>
+              <a:t>Easiest: moving and changing directories, </a:t>
+            </a:r>
+          </a:p>
+          <a:p>
+            <a:r>
+              <a:rPr lang="en-US" dirty="0"/>
+              <a:t>Difficult: Altering text using nano, exiting different programs, </a:t>
             </a:r>
           </a:p>
         </p:txBody>

</xml_diff>